<commit_message>
Correct Inner Join diagram
</commit_message>
<xml_diff>
--- a/tmp/TupleSketches-Vision.pptx
+++ b/tmp/TupleSketches-Vision.pptx
@@ -5428,15 +5428,7 @@
                   <a:schemeClr val="tx1"/>
                 </a:solidFill>
               </a:rPr>
-              <a:t>Using Set </a:t>
-            </a:r>
-            <a:r>
-              <a:rPr lang="en-US" sz="1600" dirty="0" smtClean="0">
-                <a:solidFill>
-                  <a:schemeClr val="tx1"/>
-                </a:solidFill>
-              </a:rPr>
-              <a:t>Expressions Across Multiple Theta Sketches</a:t>
+              <a:t>Using Set Expressions Across Multiple Theta Sketches</a:t>
             </a:r>
           </a:p>
         </p:txBody>
@@ -5507,13 +5499,8 @@
             </a:r>
             <a:r>
               <a:rPr lang="en-US" sz="1400" dirty="0"/>
-              <a:t>= </a:t>
-            </a:r>
-            <a:r>
-              <a:rPr lang="en-US" sz="1400" dirty="0"/>
-              <a:t>4</a:t>
-            </a:r>
-            <a:endParaRPr lang="en-US" sz="1400" dirty="0"/>
+              <a:t>= 4</a:t>
+            </a:r>
           </a:p>
         </p:txBody>
       </p:sp>
@@ -6210,11 +6197,7 @@
             </a:r>
             <a:r>
               <a:rPr lang="en-US" sz="1400" dirty="0" smtClean="0"/>
-              <a:t>: </a:t>
-            </a:r>
-            <a:r>
-              <a:rPr lang="en-US" sz="1400" dirty="0" smtClean="0"/>
-              <a:t>Trade-off of size / accuracy</a:t>
+              <a:t>: Trade-off of size / accuracy</a:t>
             </a:r>
             <a:endParaRPr lang="en-US" sz="1400" dirty="0"/>
           </a:p>
@@ -6322,11 +6305,6 @@
               </a:rPr>
               <a:t>Uniques</a:t>
             </a:r>
-            <a:endParaRPr lang="en-US" sz="1600" dirty="0" smtClean="0">
-              <a:solidFill>
-                <a:schemeClr val="tx1"/>
-              </a:solidFill>
-            </a:endParaRPr>
           </a:p>
         </p:txBody>
       </p:sp>
@@ -6576,15 +6554,7 @@
                   <a:schemeClr val="tx1"/>
                 </a:solidFill>
               </a:rPr>
-              <a:t>Set </a:t>
-            </a:r>
-            <a:r>
-              <a:rPr lang="en-US" sz="1600" dirty="0" smtClean="0">
-                <a:solidFill>
-                  <a:schemeClr val="tx1"/>
-                </a:solidFill>
-              </a:rPr>
-              <a:t>Expressions Across </a:t>
+              <a:t>Set Expressions Across </a:t>
             </a:r>
           </a:p>
           <a:p>
@@ -6638,11 +6608,6 @@
               </a:rPr>
               <a:t>within a Tuple Sketch</a:t>
             </a:r>
-            <a:endParaRPr lang="en-US" sz="1600" dirty="0" smtClean="0">
-              <a:solidFill>
-                <a:schemeClr val="tx1"/>
-              </a:solidFill>
-            </a:endParaRPr>
           </a:p>
         </p:txBody>
       </p:sp>
@@ -6671,11 +6636,7 @@
             <a:pPr algn="ctr"/>
             <a:r>
               <a:rPr lang="en-US" sz="2400" dirty="0" smtClean="0"/>
-              <a:t>Associative Behavior Analysis Using Tuple </a:t>
-            </a:r>
-            <a:r>
-              <a:rPr lang="en-US" sz="2400" dirty="0" smtClean="0"/>
-              <a:t>Sketches</a:t>
+              <a:t>Associative Behavior Analysis Using Tuple Sketches</a:t>
             </a:r>
             <a:endParaRPr lang="en-US" sz="2400" dirty="0"/>
           </a:p>
@@ -6711,7 +6672,6 @@
               <a:rPr lang="en-US" sz="1600" dirty="0"/>
               <a:t>4</a:t>
             </a:r>
-            <a:endParaRPr lang="en-US" sz="1600" dirty="0"/>
           </a:p>
         </p:txBody>
       </p:sp>
@@ -8445,11 +8405,6 @@
               </a:rPr>
               <a:t>Additive Attributes</a:t>
             </a:r>
-            <a:endParaRPr lang="en-US" sz="1600" dirty="0" smtClean="0">
-              <a:solidFill>
-                <a:schemeClr val="tx1"/>
-              </a:solidFill>
-            </a:endParaRPr>
           </a:p>
         </p:txBody>
       </p:sp>
@@ -8935,7 +8890,7 @@
         </p:nvSpPr>
         <p:spPr>
           <a:xfrm>
-            <a:off x="2679510" y="1193702"/>
+            <a:off x="2925076" y="1200208"/>
             <a:ext cx="419479" cy="307777"/>
           </a:xfrm>
           <a:prstGeom prst="rect">
@@ -8974,13 +8929,13 @@
           <p:nvPr>
             <p:extLst>
               <p:ext uri="{D42A27DB-BD31-4B8C-83A1-F6EECF244321}">
-                <p14:modId xmlns:p14="http://schemas.microsoft.com/office/powerpoint/2010/main" val="1964564645"/>
+                <p14:modId xmlns:p14="http://schemas.microsoft.com/office/powerpoint/2010/main" val="1059698218"/>
               </p:ext>
             </p:extLst>
           </p:nvPr>
         </p:nvGraphicFramePr>
         <p:xfrm>
-          <a:off x="2717610" y="1498226"/>
+          <a:off x="2963176" y="1504732"/>
           <a:ext cx="813180" cy="1483360"/>
         </p:xfrm>
         <a:graphic>
@@ -9281,7 +9236,7 @@
                       <a:tailEnd type="none" w="med" len="med"/>
                     </a:lnB>
                     <a:solidFill>
-                      <a:srgbClr val="FFFF00"/>
+                      <a:srgbClr val="CCFFCC"/>
                     </a:solidFill>
                   </a:tcPr>
                 </a:tc>
@@ -9410,7 +9365,7 @@
                       <a:tailEnd type="none" w="med" len="med"/>
                     </a:lnB>
                     <a:solidFill>
-                      <a:srgbClr val="FFFF00"/>
+                      <a:srgbClr val="CCFFCC"/>
                     </a:solidFill>
                   </a:tcPr>
                 </a:tc>
@@ -9539,7 +9494,7 @@
           <p:nvPr>
             <p:extLst>
               <p:ext uri="{D42A27DB-BD31-4B8C-83A1-F6EECF244321}">
-                <p14:modId xmlns:p14="http://schemas.microsoft.com/office/powerpoint/2010/main" val="1251814844"/>
+                <p14:modId xmlns:p14="http://schemas.microsoft.com/office/powerpoint/2010/main" val="3175564090"/>
               </p:ext>
             </p:extLst>
           </p:nvPr>
@@ -9609,6 +9564,618 @@
                       <a:tailEnd type="none" w="med" len="med"/>
                     </a:lnB>
                     <a:solidFill>
+                      <a:srgbClr val="CCFFCC"/>
+                    </a:solidFill>
+                  </a:tcPr>
+                </a:tc>
+                <a:tc>
+                  <a:txBody>
+                    <a:bodyPr/>
+                    <a:lstStyle/>
+                    <a:p>
+                      <a:r>
+                        <a:rPr lang="en-US" sz="1400" b="0" i="0" dirty="0" smtClean="0">
+                          <a:sym typeface="Wingdings"/>
+                        </a:rPr>
+                        <a:t>y3</a:t>
+                      </a:r>
+                      <a:endParaRPr lang="en-US" sz="1400" b="0" i="0" dirty="0"/>
+                    </a:p>
+                  </a:txBody>
+                  <a:tcPr>
+                    <a:lnL w="12700" cap="flat" cmpd="sng" algn="ctr">
+                      <a:solidFill>
+                        <a:scrgbClr r="0" g="0" b="0"/>
+                      </a:solidFill>
+                      <a:prstDash val="solid"/>
+                      <a:round/>
+                      <a:headEnd type="none" w="med" len="med"/>
+                      <a:tailEnd type="none" w="med" len="med"/>
+                    </a:lnL>
+                    <a:lnR w="12700" cap="flat" cmpd="sng" algn="ctr">
+                      <a:solidFill>
+                        <a:scrgbClr r="0" g="0" b="0"/>
+                      </a:solidFill>
+                      <a:prstDash val="solid"/>
+                      <a:round/>
+                      <a:headEnd type="none" w="med" len="med"/>
+                      <a:tailEnd type="none" w="med" len="med"/>
+                    </a:lnR>
+                    <a:lnT w="12700" cap="flat" cmpd="sng" algn="ctr">
+                      <a:solidFill>
+                        <a:scrgbClr r="0" g="0" b="0"/>
+                      </a:solidFill>
+                      <a:prstDash val="solid"/>
+                      <a:round/>
+                      <a:headEnd type="none" w="med" len="med"/>
+                      <a:tailEnd type="none" w="med" len="med"/>
+                    </a:lnT>
+                    <a:lnB w="12700" cap="flat" cmpd="sng" algn="ctr">
+                      <a:solidFill>
+                        <a:scrgbClr r="0" g="0" b="0"/>
+                      </a:solidFill>
+                      <a:prstDash val="solid"/>
+                      <a:round/>
+                      <a:headEnd type="none" w="med" len="med"/>
+                      <a:tailEnd type="none" w="med" len="med"/>
+                    </a:lnB>
+                    <a:solidFill>
+                      <a:srgbClr val="FFFF00"/>
+                    </a:solidFill>
+                  </a:tcPr>
+                </a:tc>
+              </a:tr>
+              <a:tr h="370840">
+                <a:tc>
+                  <a:txBody>
+                    <a:bodyPr/>
+                    <a:lstStyle/>
+                    <a:p>
+                      <a:r>
+                        <a:rPr lang="en-US" sz="1400" dirty="0" smtClean="0"/>
+                        <a:t>h4</a:t>
+                      </a:r>
+                      <a:endParaRPr lang="en-US" sz="1400" b="0" i="0" dirty="0"/>
+                    </a:p>
+                  </a:txBody>
+                  <a:tcPr>
+                    <a:lnL w="12700" cap="flat" cmpd="sng" algn="ctr">
+                      <a:solidFill>
+                        <a:scrgbClr r="0" g="0" b="0"/>
+                      </a:solidFill>
+                      <a:prstDash val="solid"/>
+                      <a:round/>
+                      <a:headEnd type="none" w="med" len="med"/>
+                      <a:tailEnd type="none" w="med" len="med"/>
+                    </a:lnL>
+                    <a:lnR w="12700" cap="flat" cmpd="sng" algn="ctr">
+                      <a:solidFill>
+                        <a:scrgbClr r="0" g="0" b="0"/>
+                      </a:solidFill>
+                      <a:prstDash val="solid"/>
+                      <a:round/>
+                      <a:headEnd type="none" w="med" len="med"/>
+                      <a:tailEnd type="none" w="med" len="med"/>
+                    </a:lnR>
+                    <a:lnT w="12700" cap="flat" cmpd="sng" algn="ctr">
+                      <a:solidFill>
+                        <a:scrgbClr r="0" g="0" b="0"/>
+                      </a:solidFill>
+                      <a:prstDash val="solid"/>
+                      <a:round/>
+                      <a:headEnd type="none" w="med" len="med"/>
+                      <a:tailEnd type="none" w="med" len="med"/>
+                    </a:lnT>
+                    <a:lnB w="12700" cap="flat" cmpd="sng" algn="ctr">
+                      <a:solidFill>
+                        <a:scrgbClr r="0" g="0" b="0"/>
+                      </a:solidFill>
+                      <a:prstDash val="solid"/>
+                      <a:round/>
+                      <a:headEnd type="none" w="med" len="med"/>
+                      <a:tailEnd type="none" w="med" len="med"/>
+                    </a:lnB>
+                    <a:solidFill>
+                      <a:srgbClr val="CCFFCC"/>
+                    </a:solidFill>
+                  </a:tcPr>
+                </a:tc>
+                <a:tc>
+                  <a:txBody>
+                    <a:bodyPr/>
+                    <a:lstStyle/>
+                    <a:p>
+                      <a:pPr marL="0" marR="0" indent="0" algn="l" defTabSz="457200" rtl="0" eaLnBrk="1" fontAlgn="auto" latinLnBrk="0" hangingPunct="1">
+                        <a:lnSpc>
+                          <a:spcPct val="100000"/>
+                        </a:lnSpc>
+                        <a:spcBef>
+                          <a:spcPts val="0"/>
+                        </a:spcBef>
+                        <a:spcAft>
+                          <a:spcPts val="0"/>
+                        </a:spcAft>
+                        <a:buClrTx/>
+                        <a:buSzTx/>
+                        <a:buFontTx/>
+                        <a:buNone/>
+                        <a:tabLst/>
+                        <a:defRPr/>
+                      </a:pPr>
+                      <a:r>
+                        <a:rPr lang="en-US" sz="1400" b="0" i="0" dirty="0" smtClean="0">
+                          <a:sym typeface="Wingdings"/>
+                        </a:rPr>
+                        <a:t>y4</a:t>
+                      </a:r>
+                      <a:endParaRPr lang="en-US" sz="1400" b="0" i="0" dirty="0"/>
+                    </a:p>
+                  </a:txBody>
+                  <a:tcPr>
+                    <a:lnL w="12700" cap="flat" cmpd="sng" algn="ctr">
+                      <a:solidFill>
+                        <a:scrgbClr r="0" g="0" b="0"/>
+                      </a:solidFill>
+                      <a:prstDash val="solid"/>
+                      <a:round/>
+                      <a:headEnd type="none" w="med" len="med"/>
+                      <a:tailEnd type="none" w="med" len="med"/>
+                    </a:lnL>
+                    <a:lnR w="12700" cap="flat" cmpd="sng" algn="ctr">
+                      <a:solidFill>
+                        <a:scrgbClr r="0" g="0" b="0"/>
+                      </a:solidFill>
+                      <a:prstDash val="solid"/>
+                      <a:round/>
+                      <a:headEnd type="none" w="med" len="med"/>
+                      <a:tailEnd type="none" w="med" len="med"/>
+                    </a:lnR>
+                    <a:lnT w="12700" cap="flat" cmpd="sng" algn="ctr">
+                      <a:solidFill>
+                        <a:scrgbClr r="0" g="0" b="0"/>
+                      </a:solidFill>
+                      <a:prstDash val="solid"/>
+                      <a:round/>
+                      <a:headEnd type="none" w="med" len="med"/>
+                      <a:tailEnd type="none" w="med" len="med"/>
+                    </a:lnT>
+                    <a:lnB w="12700" cap="flat" cmpd="sng" algn="ctr">
+                      <a:solidFill>
+                        <a:scrgbClr r="0" g="0" b="0"/>
+                      </a:solidFill>
+                      <a:prstDash val="solid"/>
+                      <a:round/>
+                      <a:headEnd type="none" w="med" len="med"/>
+                      <a:tailEnd type="none" w="med" len="med"/>
+                    </a:lnB>
+                    <a:solidFill>
+                      <a:srgbClr val="FFFF00"/>
+                    </a:solidFill>
+                  </a:tcPr>
+                </a:tc>
+              </a:tr>
+              <a:tr h="370840">
+                <a:tc>
+                  <a:txBody>
+                    <a:bodyPr/>
+                    <a:lstStyle/>
+                    <a:p>
+                      <a:r>
+                        <a:rPr lang="en-US" sz="1400" dirty="0" smtClean="0"/>
+                        <a:t>h5</a:t>
+                      </a:r>
+                      <a:endParaRPr lang="en-US" sz="1400" b="0" i="0" dirty="0"/>
+                    </a:p>
+                  </a:txBody>
+                  <a:tcPr>
+                    <a:lnL w="12700" cap="flat" cmpd="sng" algn="ctr">
+                      <a:solidFill>
+                        <a:scrgbClr r="0" g="0" b="0"/>
+                      </a:solidFill>
+                      <a:prstDash val="solid"/>
+                      <a:round/>
+                      <a:headEnd type="none" w="med" len="med"/>
+                      <a:tailEnd type="none" w="med" len="med"/>
+                    </a:lnL>
+                    <a:lnR w="12700" cap="flat" cmpd="sng" algn="ctr">
+                      <a:solidFill>
+                        <a:scrgbClr r="0" g="0" b="0"/>
+                      </a:solidFill>
+                      <a:prstDash val="solid"/>
+                      <a:round/>
+                      <a:headEnd type="none" w="med" len="med"/>
+                      <a:tailEnd type="none" w="med" len="med"/>
+                    </a:lnR>
+                    <a:lnT w="12700" cap="flat" cmpd="sng" algn="ctr">
+                      <a:solidFill>
+                        <a:scrgbClr r="0" g="0" b="0"/>
+                      </a:solidFill>
+                      <a:prstDash val="solid"/>
+                      <a:round/>
+                      <a:headEnd type="none" w="med" len="med"/>
+                      <a:tailEnd type="none" w="med" len="med"/>
+                    </a:lnT>
+                    <a:lnB w="12700" cap="flat" cmpd="sng" algn="ctr">
+                      <a:solidFill>
+                        <a:scrgbClr r="0" g="0" b="0"/>
+                      </a:solidFill>
+                      <a:prstDash val="solid"/>
+                      <a:round/>
+                      <a:headEnd type="none" w="med" len="med"/>
+                      <a:tailEnd type="none" w="med" len="med"/>
+                    </a:lnB>
+                  </a:tcPr>
+                </a:tc>
+                <a:tc>
+                  <a:txBody>
+                    <a:bodyPr/>
+                    <a:lstStyle/>
+                    <a:p>
+                      <a:pPr marL="0" marR="0" indent="0" algn="l" defTabSz="457200" rtl="0" eaLnBrk="1" fontAlgn="auto" latinLnBrk="0" hangingPunct="1">
+                        <a:lnSpc>
+                          <a:spcPct val="100000"/>
+                        </a:lnSpc>
+                        <a:spcBef>
+                          <a:spcPts val="0"/>
+                        </a:spcBef>
+                        <a:spcAft>
+                          <a:spcPts val="0"/>
+                        </a:spcAft>
+                        <a:buClrTx/>
+                        <a:buSzTx/>
+                        <a:buFontTx/>
+                        <a:buNone/>
+                        <a:tabLst/>
+                        <a:defRPr/>
+                      </a:pPr>
+                      <a:r>
+                        <a:rPr lang="en-US" sz="1400" b="0" i="0" dirty="0" smtClean="0">
+                          <a:sym typeface="Wingdings"/>
+                        </a:rPr>
+                        <a:t>y5</a:t>
+                      </a:r>
+                      <a:endParaRPr lang="en-US" sz="1400" b="0" i="0" dirty="0"/>
+                    </a:p>
+                  </a:txBody>
+                  <a:tcPr>
+                    <a:lnL w="12700" cap="flat" cmpd="sng" algn="ctr">
+                      <a:solidFill>
+                        <a:scrgbClr r="0" g="0" b="0"/>
+                      </a:solidFill>
+                      <a:prstDash val="solid"/>
+                      <a:round/>
+                      <a:headEnd type="none" w="med" len="med"/>
+                      <a:tailEnd type="none" w="med" len="med"/>
+                    </a:lnL>
+                    <a:lnR w="12700" cap="flat" cmpd="sng" algn="ctr">
+                      <a:solidFill>
+                        <a:scrgbClr r="0" g="0" b="0"/>
+                      </a:solidFill>
+                      <a:prstDash val="solid"/>
+                      <a:round/>
+                      <a:headEnd type="none" w="med" len="med"/>
+                      <a:tailEnd type="none" w="med" len="med"/>
+                    </a:lnR>
+                    <a:lnT w="12700" cap="flat" cmpd="sng" algn="ctr">
+                      <a:solidFill>
+                        <a:scrgbClr r="0" g="0" b="0"/>
+                      </a:solidFill>
+                      <a:prstDash val="solid"/>
+                      <a:round/>
+                      <a:headEnd type="none" w="med" len="med"/>
+                      <a:tailEnd type="none" w="med" len="med"/>
+                    </a:lnT>
+                    <a:lnB w="12700" cap="flat" cmpd="sng" algn="ctr">
+                      <a:solidFill>
+                        <a:scrgbClr r="0" g="0" b="0"/>
+                      </a:solidFill>
+                      <a:prstDash val="solid"/>
+                      <a:round/>
+                      <a:headEnd type="none" w="med" len="med"/>
+                      <a:tailEnd type="none" w="med" len="med"/>
+                    </a:lnB>
+                  </a:tcPr>
+                </a:tc>
+              </a:tr>
+              <a:tr h="370840">
+                <a:tc>
+                  <a:txBody>
+                    <a:bodyPr/>
+                    <a:lstStyle/>
+                    <a:p>
+                      <a:r>
+                        <a:rPr lang="en-US" sz="1400" b="0" i="0" dirty="0" smtClean="0"/>
+                        <a:t>h6</a:t>
+                      </a:r>
+                      <a:endParaRPr lang="en-US" sz="1400" b="0" i="0" dirty="0"/>
+                    </a:p>
+                  </a:txBody>
+                  <a:tcPr>
+                    <a:lnL w="12700" cap="flat" cmpd="sng" algn="ctr">
+                      <a:solidFill>
+                        <a:scrgbClr r="0" g="0" b="0"/>
+                      </a:solidFill>
+                      <a:prstDash val="solid"/>
+                      <a:round/>
+                      <a:headEnd type="none" w="med" len="med"/>
+                      <a:tailEnd type="none" w="med" len="med"/>
+                    </a:lnL>
+                    <a:lnR w="12700" cap="flat" cmpd="sng" algn="ctr">
+                      <a:solidFill>
+                        <a:scrgbClr r="0" g="0" b="0"/>
+                      </a:solidFill>
+                      <a:prstDash val="solid"/>
+                      <a:round/>
+                      <a:headEnd type="none" w="med" len="med"/>
+                      <a:tailEnd type="none" w="med" len="med"/>
+                    </a:lnR>
+                    <a:lnT w="12700" cap="flat" cmpd="sng" algn="ctr">
+                      <a:solidFill>
+                        <a:scrgbClr r="0" g="0" b="0"/>
+                      </a:solidFill>
+                      <a:prstDash val="solid"/>
+                      <a:round/>
+                      <a:headEnd type="none" w="med" len="med"/>
+                      <a:tailEnd type="none" w="med" len="med"/>
+                    </a:lnT>
+                    <a:lnB w="12700" cap="flat" cmpd="sng" algn="ctr">
+                      <a:solidFill>
+                        <a:scrgbClr r="0" g="0" b="0"/>
+                      </a:solidFill>
+                      <a:prstDash val="solid"/>
+                      <a:round/>
+                      <a:headEnd type="none" w="med" len="med"/>
+                      <a:tailEnd type="none" w="med" len="med"/>
+                    </a:lnB>
+                  </a:tcPr>
+                </a:tc>
+                <a:tc>
+                  <a:txBody>
+                    <a:bodyPr/>
+                    <a:lstStyle/>
+                    <a:p>
+                      <a:pPr marL="0" marR="0" indent="0" algn="l" defTabSz="457200" rtl="0" eaLnBrk="1" fontAlgn="auto" latinLnBrk="0" hangingPunct="1">
+                        <a:lnSpc>
+                          <a:spcPct val="100000"/>
+                        </a:lnSpc>
+                        <a:spcBef>
+                          <a:spcPts val="0"/>
+                        </a:spcBef>
+                        <a:spcAft>
+                          <a:spcPts val="0"/>
+                        </a:spcAft>
+                        <a:buClrTx/>
+                        <a:buSzTx/>
+                        <a:buFontTx/>
+                        <a:buNone/>
+                        <a:tabLst/>
+                        <a:defRPr/>
+                      </a:pPr>
+                      <a:r>
+                        <a:rPr lang="en-US" sz="1400" b="0" i="0" dirty="0" smtClean="0">
+                          <a:sym typeface="Wingdings"/>
+                        </a:rPr>
+                        <a:t>y6</a:t>
+                      </a:r>
+                      <a:endParaRPr lang="en-US" sz="1400" b="0" i="0" dirty="0" smtClean="0"/>
+                    </a:p>
+                  </a:txBody>
+                  <a:tcPr>
+                    <a:lnL w="12700" cap="flat" cmpd="sng" algn="ctr">
+                      <a:solidFill>
+                        <a:scrgbClr r="0" g="0" b="0"/>
+                      </a:solidFill>
+                      <a:prstDash val="solid"/>
+                      <a:round/>
+                      <a:headEnd type="none" w="med" len="med"/>
+                      <a:tailEnd type="none" w="med" len="med"/>
+                    </a:lnL>
+                    <a:lnR w="12700" cap="flat" cmpd="sng" algn="ctr">
+                      <a:solidFill>
+                        <a:scrgbClr r="0" g="0" b="0"/>
+                      </a:solidFill>
+                      <a:prstDash val="solid"/>
+                      <a:round/>
+                      <a:headEnd type="none" w="med" len="med"/>
+                      <a:tailEnd type="none" w="med" len="med"/>
+                    </a:lnR>
+                    <a:lnT w="12700" cap="flat" cmpd="sng" algn="ctr">
+                      <a:solidFill>
+                        <a:scrgbClr r="0" g="0" b="0"/>
+                      </a:solidFill>
+                      <a:prstDash val="solid"/>
+                      <a:round/>
+                      <a:headEnd type="none" w="med" len="med"/>
+                      <a:tailEnd type="none" w="med" len="med"/>
+                    </a:lnT>
+                    <a:lnB w="12700" cap="flat" cmpd="sng" algn="ctr">
+                      <a:solidFill>
+                        <a:scrgbClr r="0" g="0" b="0"/>
+                      </a:solidFill>
+                      <a:prstDash val="solid"/>
+                      <a:round/>
+                      <a:headEnd type="none" w="med" len="med"/>
+                      <a:tailEnd type="none" w="med" len="med"/>
+                    </a:lnB>
+                  </a:tcPr>
+                </a:tc>
+              </a:tr>
+            </a:tbl>
+          </a:graphicData>
+        </a:graphic>
+      </p:graphicFrame>
+      <p:sp>
+        <p:nvSpPr>
+          <p:cNvPr id="34" name="TextBox 33"/>
+          <p:cNvSpPr txBox="1"/>
+          <p:nvPr/>
+        </p:nvSpPr>
+        <p:spPr>
+          <a:xfrm>
+            <a:off x="5543359" y="1938635"/>
+            <a:ext cx="540130" cy="307777"/>
+          </a:xfrm>
+          <a:prstGeom prst="rect">
+            <a:avLst/>
+          </a:prstGeom>
+          <a:noFill/>
+          <a:ln>
+            <a:noFill/>
+          </a:ln>
+        </p:spPr>
+        <p:txBody>
+          <a:bodyPr wrap="square" rtlCol="0">
+            <a:spAutoFit/>
+          </a:bodyPr>
+          <a:lstStyle/>
+          <a:p>
+            <a:pPr algn="ctr"/>
+            <a:r>
+              <a:rPr lang="en-US" sz="1400" dirty="0" err="1" smtClean="0"/>
+              <a:t>θ</a:t>
+            </a:r>
+            <a:r>
+              <a:rPr lang="en-US" sz="1400" baseline="-25000" dirty="0" err="1" smtClean="0"/>
+              <a:t>min</a:t>
+            </a:r>
+            <a:endParaRPr lang="en-US" sz="1400" baseline="-25000" dirty="0"/>
+          </a:p>
+        </p:txBody>
+      </p:sp>
+      <p:graphicFrame>
+        <p:nvGraphicFramePr>
+          <p:cNvPr id="35" name="Table 34"/>
+          <p:cNvGraphicFramePr>
+            <a:graphicFrameLocks noGrp="1"/>
+          </p:cNvGraphicFramePr>
+          <p:nvPr>
+            <p:extLst>
+              <p:ext uri="{D42A27DB-BD31-4B8C-83A1-F6EECF244321}">
+                <p14:modId xmlns:p14="http://schemas.microsoft.com/office/powerpoint/2010/main" val="2087825772"/>
+              </p:ext>
+            </p:extLst>
+          </p:nvPr>
+        </p:nvGraphicFramePr>
+        <p:xfrm>
+          <a:off x="5613209" y="2243159"/>
+          <a:ext cx="1219579" cy="741680"/>
+        </p:xfrm>
+        <a:graphic>
+          <a:graphicData uri="http://schemas.openxmlformats.org/drawingml/2006/table">
+            <a:tbl>
+              <a:tblPr firstRow="1" bandRow="1">
+                <a:tableStyleId>{2D5ABB26-0587-4C30-8999-92F81FD0307C}</a:tableStyleId>
+              </a:tblPr>
+              <a:tblGrid>
+                <a:gridCol w="423893"/>
+                <a:gridCol w="397843"/>
+                <a:gridCol w="397843"/>
+              </a:tblGrid>
+              <a:tr h="370840">
+                <a:tc>
+                  <a:txBody>
+                    <a:bodyPr/>
+                    <a:lstStyle/>
+                    <a:p>
+                      <a:r>
+                        <a:rPr lang="en-US" sz="1400" dirty="0" smtClean="0"/>
+                        <a:t>h3</a:t>
+                      </a:r>
+                      <a:endParaRPr lang="en-US" sz="1400" b="0" i="0" dirty="0"/>
+                    </a:p>
+                  </a:txBody>
+                  <a:tcPr>
+                    <a:lnL w="12700" cap="flat" cmpd="sng" algn="ctr">
+                      <a:solidFill>
+                        <a:scrgbClr r="0" g="0" b="0"/>
+                      </a:solidFill>
+                      <a:prstDash val="solid"/>
+                      <a:round/>
+                      <a:headEnd type="none" w="med" len="med"/>
+                      <a:tailEnd type="none" w="med" len="med"/>
+                    </a:lnL>
+                    <a:lnR w="12700" cap="flat" cmpd="sng" algn="ctr">
+                      <a:solidFill>
+                        <a:scrgbClr r="0" g="0" b="0"/>
+                      </a:solidFill>
+                      <a:prstDash val="solid"/>
+                      <a:round/>
+                      <a:headEnd type="none" w="med" len="med"/>
+                      <a:tailEnd type="none" w="med" len="med"/>
+                    </a:lnR>
+                    <a:lnT w="12700" cap="flat" cmpd="sng" algn="ctr">
+                      <a:solidFill>
+                        <a:scrgbClr r="0" g="0" b="0"/>
+                      </a:solidFill>
+                      <a:prstDash val="solid"/>
+                      <a:round/>
+                      <a:headEnd type="none" w="med" len="med"/>
+                      <a:tailEnd type="none" w="med" len="med"/>
+                    </a:lnT>
+                    <a:lnB w="12700" cap="flat" cmpd="sng" algn="ctr">
+                      <a:solidFill>
+                        <a:scrgbClr r="0" g="0" b="0"/>
+                      </a:solidFill>
+                      <a:prstDash val="solid"/>
+                      <a:round/>
+                      <a:headEnd type="none" w="med" len="med"/>
+                      <a:tailEnd type="none" w="med" len="med"/>
+                    </a:lnB>
+                    <a:solidFill>
+                      <a:srgbClr val="CCFFCC"/>
+                    </a:solidFill>
+                  </a:tcPr>
+                </a:tc>
+                <a:tc>
+                  <a:txBody>
+                    <a:bodyPr/>
+                    <a:lstStyle/>
+                    <a:p>
+                      <a:r>
+                        <a:rPr lang="en-US" sz="1400" b="0" i="0" dirty="0" smtClean="0"/>
+                        <a:t>x3</a:t>
+                      </a:r>
+                      <a:endParaRPr lang="en-US" sz="1400" b="0" i="0" dirty="0"/>
+                    </a:p>
+                  </a:txBody>
+                  <a:tcPr>
+                    <a:lnL w="12700" cap="flat" cmpd="sng" algn="ctr">
+                      <a:solidFill>
+                        <a:scrgbClr r="0" g="0" b="0"/>
+                      </a:solidFill>
+                      <a:prstDash val="solid"/>
+                      <a:round/>
+                      <a:headEnd type="none" w="med" len="med"/>
+                      <a:tailEnd type="none" w="med" len="med"/>
+                    </a:lnL>
+                    <a:lnR w="12700" cap="flat" cmpd="sng" algn="ctr">
+                      <a:solidFill>
+                        <a:scrgbClr r="0" g="0" b="0"/>
+                      </a:solidFill>
+                      <a:prstDash val="solid"/>
+                      <a:round/>
+                      <a:headEnd type="none" w="med" len="med"/>
+                      <a:tailEnd type="none" w="med" len="med"/>
+                    </a:lnR>
+                    <a:lnT w="12700" cap="flat" cmpd="sng" algn="ctr">
+                      <a:solidFill>
+                        <a:scrgbClr r="0" g="0" b="0"/>
+                      </a:solidFill>
+                      <a:prstDash val="solid"/>
+                      <a:round/>
+                      <a:headEnd type="none" w="med" len="med"/>
+                      <a:tailEnd type="none" w="med" len="med"/>
+                    </a:lnT>
+                    <a:lnB w="12700" cap="flat" cmpd="sng" algn="ctr">
+                      <a:solidFill>
+                        <a:scrgbClr r="0" g="0" b="0"/>
+                      </a:solidFill>
+                      <a:prstDash val="solid"/>
+                      <a:round/>
+                      <a:headEnd type="none" w="med" len="med"/>
+                      <a:tailEnd type="none" w="med" len="med"/>
+                    </a:lnB>
+                    <a:solidFill>
                       <a:srgbClr val="FFFF00"/>
                     </a:solidFill>
                   </a:tcPr>
@@ -9679,6 +10246,77 @@
                       <a:r>
                         <a:rPr lang="en-US" sz="1400" dirty="0" smtClean="0"/>
                         <a:t>h4</a:t>
+                      </a:r>
+                      <a:endParaRPr lang="en-US" sz="1400" b="0" i="0" dirty="0"/>
+                    </a:p>
+                  </a:txBody>
+                  <a:tcPr>
+                    <a:lnL w="12700" cap="flat" cmpd="sng" algn="ctr">
+                      <a:solidFill>
+                        <a:scrgbClr r="0" g="0" b="0"/>
+                      </a:solidFill>
+                      <a:prstDash val="solid"/>
+                      <a:round/>
+                      <a:headEnd type="none" w="med" len="med"/>
+                      <a:tailEnd type="none" w="med" len="med"/>
+                    </a:lnL>
+                    <a:lnR w="12700" cap="flat" cmpd="sng" algn="ctr">
+                      <a:solidFill>
+                        <a:scrgbClr r="0" g="0" b="0"/>
+                      </a:solidFill>
+                      <a:prstDash val="solid"/>
+                      <a:round/>
+                      <a:headEnd type="none" w="med" len="med"/>
+                      <a:tailEnd type="none" w="med" len="med"/>
+                    </a:lnR>
+                    <a:lnT w="12700" cap="flat" cmpd="sng" algn="ctr">
+                      <a:solidFill>
+                        <a:scrgbClr r="0" g="0" b="0"/>
+                      </a:solidFill>
+                      <a:prstDash val="solid"/>
+                      <a:round/>
+                      <a:headEnd type="none" w="med" len="med"/>
+                      <a:tailEnd type="none" w="med" len="med"/>
+                    </a:lnT>
+                    <a:lnB w="12700" cap="flat" cmpd="sng" algn="ctr">
+                      <a:solidFill>
+                        <a:scrgbClr r="0" g="0" b="0"/>
+                      </a:solidFill>
+                      <a:prstDash val="solid"/>
+                      <a:round/>
+                      <a:headEnd type="none" w="med" len="med"/>
+                      <a:tailEnd type="none" w="med" len="med"/>
+                    </a:lnB>
+                    <a:solidFill>
+                      <a:srgbClr val="CCFFCC"/>
+                    </a:solidFill>
+                  </a:tcPr>
+                </a:tc>
+                <a:tc>
+                  <a:txBody>
+                    <a:bodyPr/>
+                    <a:lstStyle/>
+                    <a:p>
+                      <a:pPr marL="0" marR="0" indent="0" algn="l" defTabSz="457200" rtl="0" eaLnBrk="1" fontAlgn="auto" latinLnBrk="0" hangingPunct="1">
+                        <a:lnSpc>
+                          <a:spcPct val="100000"/>
+                        </a:lnSpc>
+                        <a:spcBef>
+                          <a:spcPts val="0"/>
+                        </a:spcBef>
+                        <a:spcAft>
+                          <a:spcPts val="0"/>
+                        </a:spcAft>
+                        <a:buClrTx/>
+                        <a:buSzTx/>
+                        <a:buFontTx/>
+                        <a:buNone/>
+                        <a:tabLst/>
+                        <a:defRPr/>
+                      </a:pPr>
+                      <a:r>
+                        <a:rPr lang="en-US" sz="1400" b="0" i="0" dirty="0" smtClean="0"/>
+                        <a:t>x4</a:t>
                       </a:r>
                       <a:endParaRPr lang="en-US" sz="1400" b="0" i="0" dirty="0"/>
                     </a:p>
@@ -9799,726 +10437,110 @@
                   </a:tcPr>
                 </a:tc>
               </a:tr>
-              <a:tr h="370840">
-                <a:tc>
-                  <a:txBody>
-                    <a:bodyPr/>
-                    <a:lstStyle/>
-                    <a:p>
-                      <a:r>
-                        <a:rPr lang="en-US" sz="1400" dirty="0" smtClean="0"/>
-                        <a:t>h5</a:t>
-                      </a:r>
-                      <a:endParaRPr lang="en-US" sz="1400" b="0" i="0" dirty="0"/>
-                    </a:p>
-                  </a:txBody>
-                  <a:tcPr>
-                    <a:lnL w="12700" cap="flat" cmpd="sng" algn="ctr">
-                      <a:solidFill>
-                        <a:scrgbClr r="0" g="0" b="0"/>
-                      </a:solidFill>
-                      <a:prstDash val="solid"/>
-                      <a:round/>
-                      <a:headEnd type="none" w="med" len="med"/>
-                      <a:tailEnd type="none" w="med" len="med"/>
-                    </a:lnL>
-                    <a:lnR w="12700" cap="flat" cmpd="sng" algn="ctr">
-                      <a:solidFill>
-                        <a:scrgbClr r="0" g="0" b="0"/>
-                      </a:solidFill>
-                      <a:prstDash val="solid"/>
-                      <a:round/>
-                      <a:headEnd type="none" w="med" len="med"/>
-                      <a:tailEnd type="none" w="med" len="med"/>
-                    </a:lnR>
-                    <a:lnT w="12700" cap="flat" cmpd="sng" algn="ctr">
-                      <a:solidFill>
-                        <a:scrgbClr r="0" g="0" b="0"/>
-                      </a:solidFill>
-                      <a:prstDash val="solid"/>
-                      <a:round/>
-                      <a:headEnd type="none" w="med" len="med"/>
-                      <a:tailEnd type="none" w="med" len="med"/>
-                    </a:lnT>
-                    <a:lnB w="12700" cap="flat" cmpd="sng" algn="ctr">
-                      <a:solidFill>
-                        <a:scrgbClr r="0" g="0" b="0"/>
-                      </a:solidFill>
-                      <a:prstDash val="solid"/>
-                      <a:round/>
-                      <a:headEnd type="none" w="med" len="med"/>
-                      <a:tailEnd type="none" w="med" len="med"/>
-                    </a:lnB>
-                  </a:tcPr>
-                </a:tc>
-                <a:tc>
-                  <a:txBody>
-                    <a:bodyPr/>
-                    <a:lstStyle/>
-                    <a:p>
-                      <a:pPr marL="0" marR="0" indent="0" algn="l" defTabSz="457200" rtl="0" eaLnBrk="1" fontAlgn="auto" latinLnBrk="0" hangingPunct="1">
-                        <a:lnSpc>
-                          <a:spcPct val="100000"/>
-                        </a:lnSpc>
-                        <a:spcBef>
-                          <a:spcPts val="0"/>
-                        </a:spcBef>
-                        <a:spcAft>
-                          <a:spcPts val="0"/>
-                        </a:spcAft>
-                        <a:buClrTx/>
-                        <a:buSzTx/>
-                        <a:buFontTx/>
-                        <a:buNone/>
-                        <a:tabLst/>
-                        <a:defRPr/>
-                      </a:pPr>
-                      <a:r>
-                        <a:rPr lang="en-US" sz="1400" b="0" i="0" dirty="0" smtClean="0">
-                          <a:sym typeface="Wingdings"/>
-                        </a:rPr>
-                        <a:t>x5</a:t>
-                      </a:r>
-                      <a:endParaRPr lang="en-US" sz="1400" b="0" i="0" dirty="0"/>
-                    </a:p>
-                  </a:txBody>
-                  <a:tcPr>
-                    <a:lnL w="12700" cap="flat" cmpd="sng" algn="ctr">
-                      <a:solidFill>
-                        <a:scrgbClr r="0" g="0" b="0"/>
-                      </a:solidFill>
-                      <a:prstDash val="solid"/>
-                      <a:round/>
-                      <a:headEnd type="none" w="med" len="med"/>
-                      <a:tailEnd type="none" w="med" len="med"/>
-                    </a:lnL>
-                    <a:lnR w="12700" cap="flat" cmpd="sng" algn="ctr">
-                      <a:solidFill>
-                        <a:scrgbClr r="0" g="0" b="0"/>
-                      </a:solidFill>
-                      <a:prstDash val="solid"/>
-                      <a:round/>
-                      <a:headEnd type="none" w="med" len="med"/>
-                      <a:tailEnd type="none" w="med" len="med"/>
-                    </a:lnR>
-                    <a:lnT w="12700" cap="flat" cmpd="sng" algn="ctr">
-                      <a:solidFill>
-                        <a:scrgbClr r="0" g="0" b="0"/>
-                      </a:solidFill>
-                      <a:prstDash val="solid"/>
-                      <a:round/>
-                      <a:headEnd type="none" w="med" len="med"/>
-                      <a:tailEnd type="none" w="med" len="med"/>
-                    </a:lnT>
-                    <a:lnB w="12700" cap="flat" cmpd="sng" algn="ctr">
-                      <a:solidFill>
-                        <a:scrgbClr r="0" g="0" b="0"/>
-                      </a:solidFill>
-                      <a:prstDash val="solid"/>
-                      <a:round/>
-                      <a:headEnd type="none" w="med" len="med"/>
-                      <a:tailEnd type="none" w="med" len="med"/>
-                    </a:lnB>
-                  </a:tcPr>
-                </a:tc>
-              </a:tr>
-              <a:tr h="370840">
-                <a:tc>
-                  <a:txBody>
-                    <a:bodyPr/>
-                    <a:lstStyle/>
-                    <a:p>
-                      <a:r>
-                        <a:rPr lang="en-US" sz="1400" b="0" i="0" dirty="0" smtClean="0"/>
-                        <a:t>h6</a:t>
-                      </a:r>
-                      <a:endParaRPr lang="en-US" sz="1400" b="0" i="0" dirty="0"/>
-                    </a:p>
-                  </a:txBody>
-                  <a:tcPr>
-                    <a:lnL w="12700" cap="flat" cmpd="sng" algn="ctr">
-                      <a:solidFill>
-                        <a:scrgbClr r="0" g="0" b="0"/>
-                      </a:solidFill>
-                      <a:prstDash val="solid"/>
-                      <a:round/>
-                      <a:headEnd type="none" w="med" len="med"/>
-                      <a:tailEnd type="none" w="med" len="med"/>
-                    </a:lnL>
-                    <a:lnR w="12700" cap="flat" cmpd="sng" algn="ctr">
-                      <a:solidFill>
-                        <a:scrgbClr r="0" g="0" b="0"/>
-                      </a:solidFill>
-                      <a:prstDash val="solid"/>
-                      <a:round/>
-                      <a:headEnd type="none" w="med" len="med"/>
-                      <a:tailEnd type="none" w="med" len="med"/>
-                    </a:lnR>
-                    <a:lnT w="12700" cap="flat" cmpd="sng" algn="ctr">
-                      <a:solidFill>
-                        <a:scrgbClr r="0" g="0" b="0"/>
-                      </a:solidFill>
-                      <a:prstDash val="solid"/>
-                      <a:round/>
-                      <a:headEnd type="none" w="med" len="med"/>
-                      <a:tailEnd type="none" w="med" len="med"/>
-                    </a:lnT>
-                    <a:lnB w="12700" cap="flat" cmpd="sng" algn="ctr">
-                      <a:solidFill>
-                        <a:scrgbClr r="0" g="0" b="0"/>
-                      </a:solidFill>
-                      <a:prstDash val="solid"/>
-                      <a:round/>
-                      <a:headEnd type="none" w="med" len="med"/>
-                      <a:tailEnd type="none" w="med" len="med"/>
-                    </a:lnB>
-                  </a:tcPr>
-                </a:tc>
-                <a:tc>
-                  <a:txBody>
-                    <a:bodyPr/>
-                    <a:lstStyle/>
-                    <a:p>
-                      <a:pPr marL="0" marR="0" indent="0" algn="l" defTabSz="457200" rtl="0" eaLnBrk="1" fontAlgn="auto" latinLnBrk="0" hangingPunct="1">
-                        <a:lnSpc>
-                          <a:spcPct val="100000"/>
-                        </a:lnSpc>
-                        <a:spcBef>
-                          <a:spcPts val="0"/>
-                        </a:spcBef>
-                        <a:spcAft>
-                          <a:spcPts val="0"/>
-                        </a:spcAft>
-                        <a:buClrTx/>
-                        <a:buSzTx/>
-                        <a:buFontTx/>
-                        <a:buNone/>
-                        <a:tabLst/>
-                        <a:defRPr/>
-                      </a:pPr>
-                      <a:r>
-                        <a:rPr lang="en-US" sz="1400" b="0" i="0" dirty="0" smtClean="0">
-                          <a:sym typeface="Wingdings"/>
-                        </a:rPr>
-                        <a:t>x6</a:t>
-                      </a:r>
-                      <a:endParaRPr lang="en-US" sz="1400" b="0" i="0" dirty="0" smtClean="0"/>
-                    </a:p>
-                  </a:txBody>
-                  <a:tcPr>
-                    <a:lnL w="12700" cap="flat" cmpd="sng" algn="ctr">
-                      <a:solidFill>
-                        <a:scrgbClr r="0" g="0" b="0"/>
-                      </a:solidFill>
-                      <a:prstDash val="solid"/>
-                      <a:round/>
-                      <a:headEnd type="none" w="med" len="med"/>
-                      <a:tailEnd type="none" w="med" len="med"/>
-                    </a:lnL>
-                    <a:lnR w="12700" cap="flat" cmpd="sng" algn="ctr">
-                      <a:solidFill>
-                        <a:scrgbClr r="0" g="0" b="0"/>
-                      </a:solidFill>
-                      <a:prstDash val="solid"/>
-                      <a:round/>
-                      <a:headEnd type="none" w="med" len="med"/>
-                      <a:tailEnd type="none" w="med" len="med"/>
-                    </a:lnR>
-                    <a:lnT w="12700" cap="flat" cmpd="sng" algn="ctr">
-                      <a:solidFill>
-                        <a:scrgbClr r="0" g="0" b="0"/>
-                      </a:solidFill>
-                      <a:prstDash val="solid"/>
-                      <a:round/>
-                      <a:headEnd type="none" w="med" len="med"/>
-                      <a:tailEnd type="none" w="med" len="med"/>
-                    </a:lnT>
-                    <a:lnB w="12700" cap="flat" cmpd="sng" algn="ctr">
-                      <a:solidFill>
-                        <a:scrgbClr r="0" g="0" b="0"/>
-                      </a:solidFill>
-                      <a:prstDash val="solid"/>
-                      <a:round/>
-                      <a:headEnd type="none" w="med" len="med"/>
-                      <a:tailEnd type="none" w="med" len="med"/>
-                    </a:lnB>
-                  </a:tcPr>
-                </a:tc>
-              </a:tr>
             </a:tbl>
           </a:graphicData>
         </a:graphic>
       </p:graphicFrame>
       <p:sp>
         <p:nvSpPr>
-          <p:cNvPr id="34" name="TextBox 33"/>
-          <p:cNvSpPr txBox="1"/>
-          <p:nvPr/>
-        </p:nvSpPr>
-        <p:spPr>
-          <a:xfrm>
-            <a:off x="5543359" y="1938635"/>
-            <a:ext cx="540130" cy="307777"/>
-          </a:xfrm>
-          <a:prstGeom prst="rect">
-            <a:avLst/>
-          </a:prstGeom>
-          <a:noFill/>
-          <a:ln>
-            <a:noFill/>
-          </a:ln>
-        </p:spPr>
-        <p:txBody>
-          <a:bodyPr wrap="square" rtlCol="0">
-            <a:spAutoFit/>
-          </a:bodyPr>
-          <a:lstStyle/>
-          <a:p>
-            <a:pPr algn="ctr"/>
-            <a:r>
-              <a:rPr lang="en-US" sz="1400" dirty="0" err="1" smtClean="0"/>
-              <a:t>θ</a:t>
-            </a:r>
-            <a:r>
-              <a:rPr lang="en-US" sz="1400" baseline="-25000" dirty="0" err="1" smtClean="0"/>
-              <a:t>min</a:t>
-            </a:r>
-            <a:endParaRPr lang="en-US" sz="1400" baseline="-25000" dirty="0"/>
-          </a:p>
-        </p:txBody>
-      </p:sp>
-      <p:graphicFrame>
-        <p:nvGraphicFramePr>
-          <p:cNvPr id="35" name="Table 34"/>
-          <p:cNvGraphicFramePr>
-            <a:graphicFrameLocks noGrp="1"/>
-          </p:cNvGraphicFramePr>
-          <p:nvPr>
-            <p:extLst>
-              <p:ext uri="{D42A27DB-BD31-4B8C-83A1-F6EECF244321}">
-                <p14:modId xmlns:p14="http://schemas.microsoft.com/office/powerpoint/2010/main" val="3593297191"/>
-              </p:ext>
-            </p:extLst>
-          </p:nvPr>
-        </p:nvGraphicFramePr>
-        <p:xfrm>
-          <a:off x="5613209" y="2243159"/>
-          <a:ext cx="1219579" cy="741680"/>
-        </p:xfrm>
-        <a:graphic>
-          <a:graphicData uri="http://schemas.openxmlformats.org/drawingml/2006/table">
-            <a:tbl>
-              <a:tblPr firstRow="1" bandRow="1">
-                <a:tableStyleId>{2D5ABB26-0587-4C30-8999-92F81FD0307C}</a:tableStyleId>
-              </a:tblPr>
-              <a:tblGrid>
-                <a:gridCol w="423893"/>
-                <a:gridCol w="397843"/>
-                <a:gridCol w="397843"/>
-              </a:tblGrid>
-              <a:tr h="370840">
-                <a:tc>
-                  <a:txBody>
-                    <a:bodyPr/>
-                    <a:lstStyle/>
-                    <a:p>
-                      <a:r>
-                        <a:rPr lang="en-US" sz="1400" dirty="0" smtClean="0"/>
-                        <a:t>h3</a:t>
-                      </a:r>
-                      <a:endParaRPr lang="en-US" sz="1400" b="0" i="0" dirty="0"/>
-                    </a:p>
-                  </a:txBody>
-                  <a:tcPr>
-                    <a:lnL w="12700" cap="flat" cmpd="sng" algn="ctr">
-                      <a:solidFill>
-                        <a:scrgbClr r="0" g="0" b="0"/>
-                      </a:solidFill>
-                      <a:prstDash val="solid"/>
-                      <a:round/>
-                      <a:headEnd type="none" w="med" len="med"/>
-                      <a:tailEnd type="none" w="med" len="med"/>
-                    </a:lnL>
-                    <a:lnR w="12700" cap="flat" cmpd="sng" algn="ctr">
-                      <a:solidFill>
-                        <a:scrgbClr r="0" g="0" b="0"/>
-                      </a:solidFill>
-                      <a:prstDash val="solid"/>
-                      <a:round/>
-                      <a:headEnd type="none" w="med" len="med"/>
-                      <a:tailEnd type="none" w="med" len="med"/>
-                    </a:lnR>
-                    <a:lnT w="12700" cap="flat" cmpd="sng" algn="ctr">
-                      <a:solidFill>
-                        <a:scrgbClr r="0" g="0" b="0"/>
-                      </a:solidFill>
-                      <a:prstDash val="solid"/>
-                      <a:round/>
-                      <a:headEnd type="none" w="med" len="med"/>
-                      <a:tailEnd type="none" w="med" len="med"/>
-                    </a:lnT>
-                    <a:lnB w="12700" cap="flat" cmpd="sng" algn="ctr">
-                      <a:solidFill>
-                        <a:scrgbClr r="0" g="0" b="0"/>
-                      </a:solidFill>
-                      <a:prstDash val="solid"/>
-                      <a:round/>
-                      <a:headEnd type="none" w="med" len="med"/>
-                      <a:tailEnd type="none" w="med" len="med"/>
-                    </a:lnB>
-                    <a:solidFill>
-                      <a:srgbClr val="FFFF00"/>
-                    </a:solidFill>
-                  </a:tcPr>
-                </a:tc>
-                <a:tc>
-                  <a:txBody>
-                    <a:bodyPr/>
-                    <a:lstStyle/>
-                    <a:p>
-                      <a:r>
-                        <a:rPr lang="en-US" sz="1400" b="0" i="0" dirty="0" smtClean="0"/>
-                        <a:t>x3</a:t>
-                      </a:r>
-                      <a:endParaRPr lang="en-US" sz="1400" b="0" i="0" dirty="0"/>
-                    </a:p>
-                  </a:txBody>
-                  <a:tcPr>
-                    <a:lnL w="12700" cap="flat" cmpd="sng" algn="ctr">
-                      <a:solidFill>
-                        <a:scrgbClr r="0" g="0" b="0"/>
-                      </a:solidFill>
-                      <a:prstDash val="solid"/>
-                      <a:round/>
-                      <a:headEnd type="none" w="med" len="med"/>
-                      <a:tailEnd type="none" w="med" len="med"/>
-                    </a:lnL>
-                    <a:lnR w="12700" cap="flat" cmpd="sng" algn="ctr">
-                      <a:solidFill>
-                        <a:scrgbClr r="0" g="0" b="0"/>
-                      </a:solidFill>
-                      <a:prstDash val="solid"/>
-                      <a:round/>
-                      <a:headEnd type="none" w="med" len="med"/>
-                      <a:tailEnd type="none" w="med" len="med"/>
-                    </a:lnR>
-                    <a:lnT w="12700" cap="flat" cmpd="sng" algn="ctr">
-                      <a:solidFill>
-                        <a:scrgbClr r="0" g="0" b="0"/>
-                      </a:solidFill>
-                      <a:prstDash val="solid"/>
-                      <a:round/>
-                      <a:headEnd type="none" w="med" len="med"/>
-                      <a:tailEnd type="none" w="med" len="med"/>
-                    </a:lnT>
-                    <a:lnB w="12700" cap="flat" cmpd="sng" algn="ctr">
-                      <a:solidFill>
-                        <a:scrgbClr r="0" g="0" b="0"/>
-                      </a:solidFill>
-                      <a:prstDash val="solid"/>
-                      <a:round/>
-                      <a:headEnd type="none" w="med" len="med"/>
-                      <a:tailEnd type="none" w="med" len="med"/>
-                    </a:lnB>
-                    <a:solidFill>
-                      <a:srgbClr val="FFFF00"/>
-                    </a:solidFill>
-                  </a:tcPr>
-                </a:tc>
-                <a:tc>
-                  <a:txBody>
-                    <a:bodyPr/>
-                    <a:lstStyle/>
-                    <a:p>
-                      <a:r>
-                        <a:rPr lang="en-US" sz="1400" b="0" i="0" dirty="0" smtClean="0">
-                          <a:sym typeface="Wingdings"/>
-                        </a:rPr>
-                        <a:t>y3</a:t>
-                      </a:r>
-                      <a:endParaRPr lang="en-US" sz="1400" b="0" i="0" dirty="0"/>
-                    </a:p>
-                  </a:txBody>
-                  <a:tcPr>
-                    <a:lnL w="12700" cap="flat" cmpd="sng" algn="ctr">
-                      <a:solidFill>
-                        <a:scrgbClr r="0" g="0" b="0"/>
-                      </a:solidFill>
-                      <a:prstDash val="solid"/>
-                      <a:round/>
-                      <a:headEnd type="none" w="med" len="med"/>
-                      <a:tailEnd type="none" w="med" len="med"/>
-                    </a:lnL>
-                    <a:lnR w="12700" cap="flat" cmpd="sng" algn="ctr">
-                      <a:solidFill>
-                        <a:scrgbClr r="0" g="0" b="0"/>
-                      </a:solidFill>
-                      <a:prstDash val="solid"/>
-                      <a:round/>
-                      <a:headEnd type="none" w="med" len="med"/>
-                      <a:tailEnd type="none" w="med" len="med"/>
-                    </a:lnR>
-                    <a:lnT w="12700" cap="flat" cmpd="sng" algn="ctr">
-                      <a:solidFill>
-                        <a:scrgbClr r="0" g="0" b="0"/>
-                      </a:solidFill>
-                      <a:prstDash val="solid"/>
-                      <a:round/>
-                      <a:headEnd type="none" w="med" len="med"/>
-                      <a:tailEnd type="none" w="med" len="med"/>
-                    </a:lnT>
-                    <a:lnB w="12700" cap="flat" cmpd="sng" algn="ctr">
-                      <a:solidFill>
-                        <a:scrgbClr r="0" g="0" b="0"/>
-                      </a:solidFill>
-                      <a:prstDash val="solid"/>
-                      <a:round/>
-                      <a:headEnd type="none" w="med" len="med"/>
-                      <a:tailEnd type="none" w="med" len="med"/>
-                    </a:lnB>
-                    <a:solidFill>
-                      <a:srgbClr val="FFFF00"/>
-                    </a:solidFill>
-                  </a:tcPr>
-                </a:tc>
-              </a:tr>
-              <a:tr h="370840">
-                <a:tc>
-                  <a:txBody>
-                    <a:bodyPr/>
-                    <a:lstStyle/>
-                    <a:p>
-                      <a:r>
-                        <a:rPr lang="en-US" sz="1400" dirty="0" smtClean="0"/>
-                        <a:t>h4</a:t>
-                      </a:r>
-                      <a:endParaRPr lang="en-US" sz="1400" b="0" i="0" dirty="0"/>
-                    </a:p>
-                  </a:txBody>
-                  <a:tcPr>
-                    <a:lnL w="12700" cap="flat" cmpd="sng" algn="ctr">
-                      <a:solidFill>
-                        <a:scrgbClr r="0" g="0" b="0"/>
-                      </a:solidFill>
-                      <a:prstDash val="solid"/>
-                      <a:round/>
-                      <a:headEnd type="none" w="med" len="med"/>
-                      <a:tailEnd type="none" w="med" len="med"/>
-                    </a:lnL>
-                    <a:lnR w="12700" cap="flat" cmpd="sng" algn="ctr">
-                      <a:solidFill>
-                        <a:scrgbClr r="0" g="0" b="0"/>
-                      </a:solidFill>
-                      <a:prstDash val="solid"/>
-                      <a:round/>
-                      <a:headEnd type="none" w="med" len="med"/>
-                      <a:tailEnd type="none" w="med" len="med"/>
-                    </a:lnR>
-                    <a:lnT w="12700" cap="flat" cmpd="sng" algn="ctr">
-                      <a:solidFill>
-                        <a:scrgbClr r="0" g="0" b="0"/>
-                      </a:solidFill>
-                      <a:prstDash val="solid"/>
-                      <a:round/>
-                      <a:headEnd type="none" w="med" len="med"/>
-                      <a:tailEnd type="none" w="med" len="med"/>
-                    </a:lnT>
-                    <a:lnB w="12700" cap="flat" cmpd="sng" algn="ctr">
-                      <a:solidFill>
-                        <a:scrgbClr r="0" g="0" b="0"/>
-                      </a:solidFill>
-                      <a:prstDash val="solid"/>
-                      <a:round/>
-                      <a:headEnd type="none" w="med" len="med"/>
-                      <a:tailEnd type="none" w="med" len="med"/>
-                    </a:lnB>
-                    <a:solidFill>
-                      <a:srgbClr val="FFFF00"/>
-                    </a:solidFill>
-                  </a:tcPr>
-                </a:tc>
-                <a:tc>
-                  <a:txBody>
-                    <a:bodyPr/>
-                    <a:lstStyle/>
-                    <a:p>
-                      <a:pPr marL="0" marR="0" indent="0" algn="l" defTabSz="457200" rtl="0" eaLnBrk="1" fontAlgn="auto" latinLnBrk="0" hangingPunct="1">
-                        <a:lnSpc>
-                          <a:spcPct val="100000"/>
-                        </a:lnSpc>
-                        <a:spcBef>
-                          <a:spcPts val="0"/>
-                        </a:spcBef>
-                        <a:spcAft>
-                          <a:spcPts val="0"/>
-                        </a:spcAft>
-                        <a:buClrTx/>
-                        <a:buSzTx/>
-                        <a:buFontTx/>
-                        <a:buNone/>
-                        <a:tabLst/>
-                        <a:defRPr/>
-                      </a:pPr>
-                      <a:r>
-                        <a:rPr lang="en-US" sz="1400" b="0" i="0" dirty="0" smtClean="0"/>
-                        <a:t>x4</a:t>
-                      </a:r>
-                      <a:endParaRPr lang="en-US" sz="1400" b="0" i="0" dirty="0"/>
-                    </a:p>
-                  </a:txBody>
-                  <a:tcPr>
-                    <a:lnL w="12700" cap="flat" cmpd="sng" algn="ctr">
-                      <a:solidFill>
-                        <a:scrgbClr r="0" g="0" b="0"/>
-                      </a:solidFill>
-                      <a:prstDash val="solid"/>
-                      <a:round/>
-                      <a:headEnd type="none" w="med" len="med"/>
-                      <a:tailEnd type="none" w="med" len="med"/>
-                    </a:lnL>
-                    <a:lnR w="12700" cap="flat" cmpd="sng" algn="ctr">
-                      <a:solidFill>
-                        <a:scrgbClr r="0" g="0" b="0"/>
-                      </a:solidFill>
-                      <a:prstDash val="solid"/>
-                      <a:round/>
-                      <a:headEnd type="none" w="med" len="med"/>
-                      <a:tailEnd type="none" w="med" len="med"/>
-                    </a:lnR>
-                    <a:lnT w="12700" cap="flat" cmpd="sng" algn="ctr">
-                      <a:solidFill>
-                        <a:scrgbClr r="0" g="0" b="0"/>
-                      </a:solidFill>
-                      <a:prstDash val="solid"/>
-                      <a:round/>
-                      <a:headEnd type="none" w="med" len="med"/>
-                      <a:tailEnd type="none" w="med" len="med"/>
-                    </a:lnT>
-                    <a:lnB w="12700" cap="flat" cmpd="sng" algn="ctr">
-                      <a:solidFill>
-                        <a:scrgbClr r="0" g="0" b="0"/>
-                      </a:solidFill>
-                      <a:prstDash val="solid"/>
-                      <a:round/>
-                      <a:headEnd type="none" w="med" len="med"/>
-                      <a:tailEnd type="none" w="med" len="med"/>
-                    </a:lnB>
-                    <a:solidFill>
-                      <a:srgbClr val="FFFF00"/>
-                    </a:solidFill>
-                  </a:tcPr>
-                </a:tc>
-                <a:tc>
-                  <a:txBody>
-                    <a:bodyPr/>
-                    <a:lstStyle/>
-                    <a:p>
-                      <a:pPr marL="0" marR="0" indent="0" algn="l" defTabSz="457200" rtl="0" eaLnBrk="1" fontAlgn="auto" latinLnBrk="0" hangingPunct="1">
-                        <a:lnSpc>
-                          <a:spcPct val="100000"/>
-                        </a:lnSpc>
-                        <a:spcBef>
-                          <a:spcPts val="0"/>
-                        </a:spcBef>
-                        <a:spcAft>
-                          <a:spcPts val="0"/>
-                        </a:spcAft>
-                        <a:buClrTx/>
-                        <a:buSzTx/>
-                        <a:buFontTx/>
-                        <a:buNone/>
-                        <a:tabLst/>
-                        <a:defRPr/>
-                      </a:pPr>
-                      <a:r>
-                        <a:rPr lang="en-US" sz="1400" b="0" i="0" dirty="0" smtClean="0">
-                          <a:sym typeface="Wingdings"/>
-                        </a:rPr>
-                        <a:t>y4</a:t>
-                      </a:r>
-                      <a:endParaRPr lang="en-US" sz="1400" b="0" i="0" dirty="0"/>
-                    </a:p>
-                  </a:txBody>
-                  <a:tcPr>
-                    <a:lnL w="12700" cap="flat" cmpd="sng" algn="ctr">
-                      <a:solidFill>
-                        <a:scrgbClr r="0" g="0" b="0"/>
-                      </a:solidFill>
-                      <a:prstDash val="solid"/>
-                      <a:round/>
-                      <a:headEnd type="none" w="med" len="med"/>
-                      <a:tailEnd type="none" w="med" len="med"/>
-                    </a:lnL>
-                    <a:lnR w="12700" cap="flat" cmpd="sng" algn="ctr">
-                      <a:solidFill>
-                        <a:scrgbClr r="0" g="0" b="0"/>
-                      </a:solidFill>
-                      <a:prstDash val="solid"/>
-                      <a:round/>
-                      <a:headEnd type="none" w="med" len="med"/>
-                      <a:tailEnd type="none" w="med" len="med"/>
-                    </a:lnR>
-                    <a:lnT w="12700" cap="flat" cmpd="sng" algn="ctr">
-                      <a:solidFill>
-                        <a:scrgbClr r="0" g="0" b="0"/>
-                      </a:solidFill>
-                      <a:prstDash val="solid"/>
-                      <a:round/>
-                      <a:headEnd type="none" w="med" len="med"/>
-                      <a:tailEnd type="none" w="med" len="med"/>
-                    </a:lnT>
-                    <a:lnB w="12700" cap="flat" cmpd="sng" algn="ctr">
-                      <a:solidFill>
-                        <a:scrgbClr r="0" g="0" b="0"/>
-                      </a:solidFill>
-                      <a:prstDash val="solid"/>
-                      <a:round/>
-                      <a:headEnd type="none" w="med" len="med"/>
-                      <a:tailEnd type="none" w="med" len="med"/>
-                    </a:lnB>
-                    <a:solidFill>
-                      <a:srgbClr val="FFFF00"/>
-                    </a:solidFill>
-                  </a:tcPr>
-                </a:tc>
-              </a:tr>
-            </a:tbl>
-          </a:graphicData>
-        </a:graphic>
-      </p:graphicFrame>
-      <p:sp>
-        <p:nvSpPr>
           <p:cNvPr id="3" name="Rectangle 2"/>
           <p:cNvSpPr/>
           <p:nvPr/>
         </p:nvSpPr>
         <p:spPr>
           <a:xfrm>
-            <a:off x="3609286" y="2429582"/>
-            <a:ext cx="368160" cy="369332"/>
+            <a:off x="2753216" y="4112039"/>
+            <a:ext cx="3266584" cy="369332"/>
           </a:xfrm>
           <a:prstGeom prst="rect">
             <a:avLst/>
           </a:prstGeom>
         </p:spPr>
         <p:txBody>
-          <a:bodyPr wrap="none">
+          <a:bodyPr wrap="square">
             <a:spAutoFit/>
           </a:bodyPr>
           <a:lstStyle/>
           <a:p>
+            <a:pPr algn="ctr"/>
             <a:r>
               <a:rPr lang="en-US" dirty="0" smtClean="0">
                 <a:latin typeface="Lucida Grande"/>
                 <a:ea typeface="Lucida Grande"/>
                 <a:cs typeface="Lucida Grande"/>
               </a:rPr>
-              <a:t>⌃</a:t>
+              <a:t>Inner Join on hash columns</a:t>
             </a:r>
             <a:endParaRPr lang="en-US" dirty="0"/>
           </a:p>
         </p:txBody>
       </p:sp>
+      <p:cxnSp>
+        <p:nvCxnSpPr>
+          <p:cNvPr id="15" name="Straight Arrow Connector 14"/>
+          <p:cNvCxnSpPr/>
+          <p:nvPr/>
+        </p:nvCxnSpPr>
+        <p:spPr>
+          <a:xfrm flipV="1">
+            <a:off x="3162824" y="3121261"/>
+            <a:ext cx="0" cy="990778"/>
+          </a:xfrm>
+          <a:prstGeom prst="straightConnector1">
+            <a:avLst/>
+          </a:prstGeom>
+          <a:ln>
+            <a:tailEnd type="stealth" w="lg" len="lg"/>
+          </a:ln>
+        </p:spPr>
+        <p:style>
+          <a:lnRef idx="2">
+            <a:schemeClr val="accent1"/>
+          </a:lnRef>
+          <a:fillRef idx="0">
+            <a:schemeClr val="accent1"/>
+          </a:fillRef>
+          <a:effectRef idx="1">
+            <a:schemeClr val="accent1"/>
+          </a:effectRef>
+          <a:fontRef idx="minor">
+            <a:schemeClr val="tx1"/>
+          </a:fontRef>
+        </p:style>
+      </p:cxnSp>
+      <p:cxnSp>
+        <p:nvCxnSpPr>
+          <p:cNvPr id="18" name="Straight Arrow Connector 17"/>
+          <p:cNvCxnSpPr/>
+          <p:nvPr/>
+        </p:nvCxnSpPr>
+        <p:spPr>
+          <a:xfrm flipV="1">
+            <a:off x="4284133" y="3818467"/>
+            <a:ext cx="0" cy="293572"/>
+          </a:xfrm>
+          <a:prstGeom prst="straightConnector1">
+            <a:avLst/>
+          </a:prstGeom>
+          <a:ln>
+            <a:tailEnd type="stealth" w="lg" len="lg"/>
+          </a:ln>
+        </p:spPr>
+        <p:style>
+          <a:lnRef idx="2">
+            <a:schemeClr val="accent1"/>
+          </a:lnRef>
+          <a:fillRef idx="0">
+            <a:schemeClr val="accent1"/>
+          </a:fillRef>
+          <a:effectRef idx="1">
+            <a:schemeClr val="accent1"/>
+          </a:effectRef>
+          <a:fontRef idx="minor">
+            <a:schemeClr val="tx1"/>
+          </a:fontRef>
+        </p:style>
+      </p:cxnSp>
     </p:spTree>
     <p:extLst>
       <p:ext uri="{BB962C8B-B14F-4D97-AF65-F5344CB8AC3E}">

</xml_diff>